<commit_message>
Nguyễn Hữu Minh Khai Update 3/12/2020
4:00PM Update File Test melt and Readme
</commit_message>
<xml_diff>
--- a/Socialnetwork.pptx
+++ b/Socialnetwork.pptx
@@ -5,7 +5,7 @@
     <p:sldMasterId id="2147483690" r:id="rId1"/>
   </p:sldMasterIdLst>
   <p:notesMasterIdLst>
-    <p:notesMasterId r:id="rId21"/>
+    <p:notesMasterId r:id="rId25"/>
   </p:notesMasterIdLst>
   <p:sldIdLst>
     <p:sldId id="256" r:id="rId2"/>
@@ -20,13 +20,17 @@
     <p:sldId id="261" r:id="rId11"/>
     <p:sldId id="271" r:id="rId12"/>
     <p:sldId id="272" r:id="rId13"/>
-    <p:sldId id="273" r:id="rId14"/>
-    <p:sldId id="274" r:id="rId15"/>
-    <p:sldId id="275" r:id="rId16"/>
-    <p:sldId id="268" r:id="rId17"/>
-    <p:sldId id="269" r:id="rId18"/>
-    <p:sldId id="270" r:id="rId19"/>
-    <p:sldId id="259" r:id="rId20"/>
+    <p:sldId id="276" r:id="rId14"/>
+    <p:sldId id="277" r:id="rId15"/>
+    <p:sldId id="278" r:id="rId16"/>
+    <p:sldId id="273" r:id="rId17"/>
+    <p:sldId id="274" r:id="rId18"/>
+    <p:sldId id="275" r:id="rId19"/>
+    <p:sldId id="268" r:id="rId20"/>
+    <p:sldId id="269" r:id="rId21"/>
+    <p:sldId id="270" r:id="rId22"/>
+    <p:sldId id="259" r:id="rId23"/>
+    <p:sldId id="279" r:id="rId24"/>
   </p:sldIdLst>
   <p:sldSz cx="12192000" cy="6858000"/>
   <p:notesSz cx="6858000" cy="9144000"/>
@@ -215,7 +219,7 @@
           <a:p>
             <a:fld id="{13FA8B4D-C7F5-4A74-B9EA-FF39DFE782E7}" type="datetimeFigureOut">
               <a:rPr lang="en-US" smtClean="0"/>
-              <a:t>11/30/2020</a:t>
+              <a:t>12/3/2020</a:t>
             </a:fld>
             <a:endParaRPr lang="en-US"/>
           </a:p>
@@ -934,6 +938,10 @@
           <a:bodyPr/>
           <a:lstStyle/>
           <a:p>
+            <a:r>
+              <a:rPr lang="vi-VN"/>
+              <a:t>Các thước đo độ trung tâm có xu hướng tương quan với nhau nhưng topN thay đổi một chút.</a:t>
+            </a:r>
             <a:endParaRPr lang="en-US" dirty="0"/>
           </a:p>
         </p:txBody>
@@ -956,6 +964,266 @@
             <a:fld id="{81C0F500-FF82-4811-9A6B-C597FBD3C1FF}" type="slidenum">
               <a:rPr lang="en-US" smtClean="0"/>
               <a:t>13</a:t>
+            </a:fld>
+            <a:endParaRPr lang="en-US"/>
+          </a:p>
+        </p:txBody>
+      </p:sp>
+    </p:spTree>
+    <p:extLst>
+      <p:ext uri="{BB962C8B-B14F-4D97-AF65-F5344CB8AC3E}">
+        <p14:creationId xmlns:p14="http://schemas.microsoft.com/office/powerpoint/2010/main" val="1599806543"/>
+      </p:ext>
+    </p:extLst>
+  </p:cSld>
+  <p:clrMapOvr>
+    <a:masterClrMapping/>
+  </p:clrMapOvr>
+</p:notes>
+</file>
+
+<file path=ppt/notesSlides/notesSlide6.xml><?xml version="1.0" encoding="utf-8"?>
+<p:notes xmlns:a="http://schemas.openxmlformats.org/drawingml/2006/main" xmlns:r="http://schemas.openxmlformats.org/officeDocument/2006/relationships" xmlns:p="http://schemas.openxmlformats.org/presentationml/2006/main">
+  <p:cSld>
+    <p:spTree>
+      <p:nvGrpSpPr>
+        <p:cNvPr id="1" name=""/>
+        <p:cNvGrpSpPr/>
+        <p:nvPr/>
+      </p:nvGrpSpPr>
+      <p:grpSpPr>
+        <a:xfrm>
+          <a:off x="0" y="0"/>
+          <a:ext cx="0" cy="0"/>
+          <a:chOff x="0" y="0"/>
+          <a:chExt cx="0" cy="0"/>
+        </a:xfrm>
+      </p:grpSpPr>
+      <p:sp>
+        <p:nvSpPr>
+          <p:cNvPr id="2" name="Slide Image Placeholder 1"/>
+          <p:cNvSpPr>
+            <a:spLocks noGrp="1" noRot="1" noChangeAspect="1"/>
+          </p:cNvSpPr>
+          <p:nvPr>
+            <p:ph type="sldImg"/>
+          </p:nvPr>
+        </p:nvSpPr>
+        <p:spPr/>
+      </p:sp>
+      <p:sp>
+        <p:nvSpPr>
+          <p:cNvPr id="3" name="Notes Placeholder 2"/>
+          <p:cNvSpPr>
+            <a:spLocks noGrp="1"/>
+          </p:cNvSpPr>
+          <p:nvPr>
+            <p:ph type="body" idx="1"/>
+          </p:nvPr>
+        </p:nvSpPr>
+        <p:spPr/>
+        <p:txBody>
+          <a:bodyPr/>
+          <a:lstStyle/>
+          <a:p>
+            <a:r>
+              <a:rPr lang="vi-VN"/>
+              <a:t>Các thước đo độ trung tâm có xu hướng tương quan với nhau nhưng topN thay đổi một chút.</a:t>
+            </a:r>
+            <a:endParaRPr lang="en-US" dirty="0"/>
+          </a:p>
+        </p:txBody>
+      </p:sp>
+      <p:sp>
+        <p:nvSpPr>
+          <p:cNvPr id="4" name="Slide Number Placeholder 3"/>
+          <p:cNvSpPr>
+            <a:spLocks noGrp="1"/>
+          </p:cNvSpPr>
+          <p:nvPr>
+            <p:ph type="sldNum" sz="quarter" idx="5"/>
+          </p:nvPr>
+        </p:nvSpPr>
+        <p:spPr/>
+        <p:txBody>
+          <a:bodyPr/>
+          <a:lstStyle/>
+          <a:p>
+            <a:fld id="{81C0F500-FF82-4811-9A6B-C597FBD3C1FF}" type="slidenum">
+              <a:rPr lang="en-US" smtClean="0"/>
+              <a:t>14</a:t>
+            </a:fld>
+            <a:endParaRPr lang="en-US"/>
+          </a:p>
+        </p:txBody>
+      </p:sp>
+    </p:spTree>
+    <p:extLst>
+      <p:ext uri="{BB962C8B-B14F-4D97-AF65-F5344CB8AC3E}">
+        <p14:creationId xmlns:p14="http://schemas.microsoft.com/office/powerpoint/2010/main" val="2129393298"/>
+      </p:ext>
+    </p:extLst>
+  </p:cSld>
+  <p:clrMapOvr>
+    <a:masterClrMapping/>
+  </p:clrMapOvr>
+</p:notes>
+</file>
+
+<file path=ppt/notesSlides/notesSlide7.xml><?xml version="1.0" encoding="utf-8"?>
+<p:notes xmlns:a="http://schemas.openxmlformats.org/drawingml/2006/main" xmlns:r="http://schemas.openxmlformats.org/officeDocument/2006/relationships" xmlns:p="http://schemas.openxmlformats.org/presentationml/2006/main">
+  <p:cSld>
+    <p:spTree>
+      <p:nvGrpSpPr>
+        <p:cNvPr id="1" name=""/>
+        <p:cNvGrpSpPr/>
+        <p:nvPr/>
+      </p:nvGrpSpPr>
+      <p:grpSpPr>
+        <a:xfrm>
+          <a:off x="0" y="0"/>
+          <a:ext cx="0" cy="0"/>
+          <a:chOff x="0" y="0"/>
+          <a:chExt cx="0" cy="0"/>
+        </a:xfrm>
+      </p:grpSpPr>
+      <p:sp>
+        <p:nvSpPr>
+          <p:cNvPr id="2" name="Slide Image Placeholder 1"/>
+          <p:cNvSpPr>
+            <a:spLocks noGrp="1" noRot="1" noChangeAspect="1"/>
+          </p:cNvSpPr>
+          <p:nvPr>
+            <p:ph type="sldImg"/>
+          </p:nvPr>
+        </p:nvSpPr>
+        <p:spPr/>
+      </p:sp>
+      <p:sp>
+        <p:nvSpPr>
+          <p:cNvPr id="3" name="Notes Placeholder 2"/>
+          <p:cNvSpPr>
+            <a:spLocks noGrp="1"/>
+          </p:cNvSpPr>
+          <p:nvPr>
+            <p:ph type="body" idx="1"/>
+          </p:nvPr>
+        </p:nvSpPr>
+        <p:spPr/>
+        <p:txBody>
+          <a:bodyPr/>
+          <a:lstStyle/>
+          <a:p>
+            <a:r>
+              <a:rPr lang="vi-VN"/>
+              <a:t>Các thước đo độ trung tâm có xu hướng tương quan với nhau nhưng topN thay đổi một chút.</a:t>
+            </a:r>
+            <a:endParaRPr lang="en-US" dirty="0"/>
+          </a:p>
+        </p:txBody>
+      </p:sp>
+      <p:sp>
+        <p:nvSpPr>
+          <p:cNvPr id="4" name="Slide Number Placeholder 3"/>
+          <p:cNvSpPr>
+            <a:spLocks noGrp="1"/>
+          </p:cNvSpPr>
+          <p:nvPr>
+            <p:ph type="sldNum" sz="quarter" idx="5"/>
+          </p:nvPr>
+        </p:nvSpPr>
+        <p:spPr/>
+        <p:txBody>
+          <a:bodyPr/>
+          <a:lstStyle/>
+          <a:p>
+            <a:fld id="{81C0F500-FF82-4811-9A6B-C597FBD3C1FF}" type="slidenum">
+              <a:rPr lang="en-US" smtClean="0"/>
+              <a:t>15</a:t>
+            </a:fld>
+            <a:endParaRPr lang="en-US"/>
+          </a:p>
+        </p:txBody>
+      </p:sp>
+    </p:spTree>
+    <p:extLst>
+      <p:ext uri="{BB962C8B-B14F-4D97-AF65-F5344CB8AC3E}">
+        <p14:creationId xmlns:p14="http://schemas.microsoft.com/office/powerpoint/2010/main" val="4157581892"/>
+      </p:ext>
+    </p:extLst>
+  </p:cSld>
+  <p:clrMapOvr>
+    <a:masterClrMapping/>
+  </p:clrMapOvr>
+</p:notes>
+</file>
+
+<file path=ppt/notesSlides/notesSlide8.xml><?xml version="1.0" encoding="utf-8"?>
+<p:notes xmlns:a="http://schemas.openxmlformats.org/drawingml/2006/main" xmlns:r="http://schemas.openxmlformats.org/officeDocument/2006/relationships" xmlns:p="http://schemas.openxmlformats.org/presentationml/2006/main">
+  <p:cSld>
+    <p:spTree>
+      <p:nvGrpSpPr>
+        <p:cNvPr id="1" name=""/>
+        <p:cNvGrpSpPr/>
+        <p:nvPr/>
+      </p:nvGrpSpPr>
+      <p:grpSpPr>
+        <a:xfrm>
+          <a:off x="0" y="0"/>
+          <a:ext cx="0" cy="0"/>
+          <a:chOff x="0" y="0"/>
+          <a:chExt cx="0" cy="0"/>
+        </a:xfrm>
+      </p:grpSpPr>
+      <p:sp>
+        <p:nvSpPr>
+          <p:cNvPr id="2" name="Slide Image Placeholder 1"/>
+          <p:cNvSpPr>
+            <a:spLocks noGrp="1" noRot="1" noChangeAspect="1"/>
+          </p:cNvSpPr>
+          <p:nvPr>
+            <p:ph type="sldImg"/>
+          </p:nvPr>
+        </p:nvSpPr>
+        <p:spPr/>
+      </p:sp>
+      <p:sp>
+        <p:nvSpPr>
+          <p:cNvPr id="3" name="Notes Placeholder 2"/>
+          <p:cNvSpPr>
+            <a:spLocks noGrp="1"/>
+          </p:cNvSpPr>
+          <p:nvPr>
+            <p:ph type="body" idx="1"/>
+          </p:nvPr>
+        </p:nvSpPr>
+        <p:spPr/>
+        <p:txBody>
+          <a:bodyPr/>
+          <a:lstStyle/>
+          <a:p>
+            <a:endParaRPr lang="en-US" dirty="0"/>
+          </a:p>
+        </p:txBody>
+      </p:sp>
+      <p:sp>
+        <p:nvSpPr>
+          <p:cNvPr id="4" name="Slide Number Placeholder 3"/>
+          <p:cNvSpPr>
+            <a:spLocks noGrp="1"/>
+          </p:cNvSpPr>
+          <p:nvPr>
+            <p:ph type="sldNum" sz="quarter" idx="5"/>
+          </p:nvPr>
+        </p:nvSpPr>
+        <p:spPr/>
+        <p:txBody>
+          <a:bodyPr/>
+          <a:lstStyle/>
+          <a:p>
+            <a:fld id="{81C0F500-FF82-4811-9A6B-C597FBD3C1FF}" type="slidenum">
+              <a:rPr lang="en-US" smtClean="0"/>
+              <a:t>16</a:t>
             </a:fld>
             <a:endParaRPr lang="en-US"/>
           </a:p>
@@ -1121,7 +1389,7 @@
           <a:p>
             <a:fld id="{A54EDF5C-C44C-42DB-BA35-C05AAB18E9E1}" type="datetimeFigureOut">
               <a:rPr lang="en-US" smtClean="0"/>
-              <a:t>11/30/2020</a:t>
+              <a:t>12/3/2020</a:t>
             </a:fld>
             <a:endParaRPr lang="en-US"/>
           </a:p>
@@ -1319,7 +1587,7 @@
           <a:p>
             <a:fld id="{A54EDF5C-C44C-42DB-BA35-C05AAB18E9E1}" type="datetimeFigureOut">
               <a:rPr lang="en-US" smtClean="0"/>
-              <a:t>11/30/2020</a:t>
+              <a:t>12/3/2020</a:t>
             </a:fld>
             <a:endParaRPr lang="en-US"/>
           </a:p>
@@ -1527,7 +1795,7 @@
           <a:p>
             <a:fld id="{A54EDF5C-C44C-42DB-BA35-C05AAB18E9E1}" type="datetimeFigureOut">
               <a:rPr lang="en-US" smtClean="0"/>
-              <a:t>11/30/2020</a:t>
+              <a:t>12/3/2020</a:t>
             </a:fld>
             <a:endParaRPr lang="en-US"/>
           </a:p>
@@ -1725,7 +1993,7 @@
           <a:p>
             <a:fld id="{A54EDF5C-C44C-42DB-BA35-C05AAB18E9E1}" type="datetimeFigureOut">
               <a:rPr lang="en-US" smtClean="0"/>
-              <a:t>11/30/2020</a:t>
+              <a:t>12/3/2020</a:t>
             </a:fld>
             <a:endParaRPr lang="en-US"/>
           </a:p>
@@ -2000,7 +2268,7 @@
           <a:p>
             <a:fld id="{A54EDF5C-C44C-42DB-BA35-C05AAB18E9E1}" type="datetimeFigureOut">
               <a:rPr lang="en-US" smtClean="0"/>
-              <a:t>11/30/2020</a:t>
+              <a:t>12/3/2020</a:t>
             </a:fld>
             <a:endParaRPr lang="en-US"/>
           </a:p>
@@ -2265,7 +2533,7 @@
           <a:p>
             <a:fld id="{A54EDF5C-C44C-42DB-BA35-C05AAB18E9E1}" type="datetimeFigureOut">
               <a:rPr lang="en-US" smtClean="0"/>
-              <a:t>11/30/2020</a:t>
+              <a:t>12/3/2020</a:t>
             </a:fld>
             <a:endParaRPr lang="en-US"/>
           </a:p>
@@ -2677,7 +2945,7 @@
           <a:p>
             <a:fld id="{A54EDF5C-C44C-42DB-BA35-C05AAB18E9E1}" type="datetimeFigureOut">
               <a:rPr lang="en-US" smtClean="0"/>
-              <a:t>11/30/2020</a:t>
+              <a:t>12/3/2020</a:t>
             </a:fld>
             <a:endParaRPr lang="en-US"/>
           </a:p>
@@ -2818,7 +3086,7 @@
           <a:p>
             <a:fld id="{A54EDF5C-C44C-42DB-BA35-C05AAB18E9E1}" type="datetimeFigureOut">
               <a:rPr lang="en-US" smtClean="0"/>
-              <a:t>11/30/2020</a:t>
+              <a:t>12/3/2020</a:t>
             </a:fld>
             <a:endParaRPr lang="en-US"/>
           </a:p>
@@ -2931,7 +3199,7 @@
           <a:p>
             <a:fld id="{A54EDF5C-C44C-42DB-BA35-C05AAB18E9E1}" type="datetimeFigureOut">
               <a:rPr lang="en-US" smtClean="0"/>
-              <a:t>11/30/2020</a:t>
+              <a:t>12/3/2020</a:t>
             </a:fld>
             <a:endParaRPr lang="en-US"/>
           </a:p>
@@ -3242,7 +3510,7 @@
           <a:p>
             <a:fld id="{A54EDF5C-C44C-42DB-BA35-C05AAB18E9E1}" type="datetimeFigureOut">
               <a:rPr lang="en-US" smtClean="0"/>
-              <a:t>11/30/2020</a:t>
+              <a:t>12/3/2020</a:t>
             </a:fld>
             <a:endParaRPr lang="en-US"/>
           </a:p>
@@ -3530,7 +3798,7 @@
           <a:p>
             <a:fld id="{A54EDF5C-C44C-42DB-BA35-C05AAB18E9E1}" type="datetimeFigureOut">
               <a:rPr lang="en-US" smtClean="0"/>
-              <a:t>11/30/2020</a:t>
+              <a:t>12/3/2020</a:t>
             </a:fld>
             <a:endParaRPr lang="en-US"/>
           </a:p>
@@ -3771,7 +4039,7 @@
           <a:p>
             <a:fld id="{A54EDF5C-C44C-42DB-BA35-C05AAB18E9E1}" type="datetimeFigureOut">
               <a:rPr lang="en-US" smtClean="0"/>
-              <a:t>11/30/2020</a:t>
+              <a:t>12/3/2020</a:t>
             </a:fld>
             <a:endParaRPr lang="en-US"/>
           </a:p>
@@ -5405,6 +5673,531 @@
       </p:grpSpPr>
       <p:sp>
         <p:nvSpPr>
+          <p:cNvPr id="2" name="Title 1">
+            <a:extLst>
+              <a:ext uri="{FF2B5EF4-FFF2-40B4-BE49-F238E27FC236}">
+                <a16:creationId xmlns:a16="http://schemas.microsoft.com/office/drawing/2014/main" id="{BF3A7AC6-5FD4-46BF-8A93-9DDCC4F41B01}"/>
+              </a:ext>
+            </a:extLst>
+          </p:cNvPr>
+          <p:cNvSpPr>
+            <a:spLocks noGrp="1"/>
+          </p:cNvSpPr>
+          <p:nvPr>
+            <p:ph type="title"/>
+          </p:nvPr>
+        </p:nvSpPr>
+        <p:spPr>
+          <a:xfrm>
+            <a:off x="1106805" y="339643"/>
+            <a:ext cx="9978390" cy="654767"/>
+          </a:xfrm>
+        </p:spPr>
+        <p:txBody>
+          <a:bodyPr>
+            <a:normAutofit fontScale="90000"/>
+          </a:bodyPr>
+          <a:lstStyle/>
+          <a:p>
+            <a:pPr algn="ctr"/>
+            <a:r>
+              <a:rPr lang="en-US" sz="4000" dirty="0" err="1">
+                <a:solidFill>
+                  <a:srgbClr val="0070C0"/>
+                </a:solidFill>
+                <a:latin typeface="Consolas" panose="020B0609020204030204" pitchFamily="49" charset="0"/>
+              </a:rPr>
+              <a:t>Dùng</a:t>
+            </a:r>
+            <a:r>
+              <a:rPr lang="en-US" sz="4000" dirty="0">
+                <a:solidFill>
+                  <a:srgbClr val="0070C0"/>
+                </a:solidFill>
+                <a:latin typeface="Consolas" panose="020B0609020204030204" pitchFamily="49" charset="0"/>
+              </a:rPr>
+              <a:t> </a:t>
+            </a:r>
+            <a:r>
+              <a:rPr lang="en-US" sz="4000" dirty="0" err="1">
+                <a:solidFill>
+                  <a:srgbClr val="0070C0"/>
+                </a:solidFill>
+                <a:latin typeface="Consolas" panose="020B0609020204030204" pitchFamily="49" charset="0"/>
+              </a:rPr>
+              <a:t>thuật</a:t>
+            </a:r>
+            <a:r>
+              <a:rPr lang="en-US" sz="4000" dirty="0">
+                <a:solidFill>
+                  <a:srgbClr val="0070C0"/>
+                </a:solidFill>
+                <a:latin typeface="Consolas" panose="020B0609020204030204" pitchFamily="49" charset="0"/>
+              </a:rPr>
+              <a:t> </a:t>
+            </a:r>
+            <a:r>
+              <a:rPr lang="en-US" sz="4000" dirty="0" err="1">
+                <a:solidFill>
+                  <a:srgbClr val="0070C0"/>
+                </a:solidFill>
+                <a:latin typeface="Consolas" panose="020B0609020204030204" pitchFamily="49" charset="0"/>
+              </a:rPr>
+              <a:t>toán</a:t>
+            </a:r>
+            <a:r>
+              <a:rPr lang="en-US" sz="4000" dirty="0">
+                <a:solidFill>
+                  <a:srgbClr val="0070C0"/>
+                </a:solidFill>
+                <a:latin typeface="Consolas" panose="020B0609020204030204" pitchFamily="49" charset="0"/>
+              </a:rPr>
+              <a:t> </a:t>
+            </a:r>
+            <a:r>
+              <a:rPr lang="en-US" sz="4000" dirty="0" err="1">
+                <a:solidFill>
+                  <a:srgbClr val="0070C0"/>
+                </a:solidFill>
+                <a:latin typeface="Consolas" panose="020B0609020204030204" pitchFamily="49" charset="0"/>
+              </a:rPr>
+              <a:t>phân</a:t>
+            </a:r>
+            <a:r>
+              <a:rPr lang="en-US" sz="4000" dirty="0">
+                <a:solidFill>
+                  <a:srgbClr val="0070C0"/>
+                </a:solidFill>
+                <a:latin typeface="Consolas" panose="020B0609020204030204" pitchFamily="49" charset="0"/>
+              </a:rPr>
+              <a:t> </a:t>
+            </a:r>
+            <a:r>
+              <a:rPr lang="en-US" sz="4000" dirty="0" err="1">
+                <a:solidFill>
+                  <a:srgbClr val="0070C0"/>
+                </a:solidFill>
+                <a:latin typeface="Consolas" panose="020B0609020204030204" pitchFamily="49" charset="0"/>
+              </a:rPr>
+              <a:t>cụm</a:t>
+            </a:r>
+            <a:r>
+              <a:rPr lang="en-US" sz="4000" dirty="0">
+                <a:solidFill>
+                  <a:srgbClr val="0070C0"/>
+                </a:solidFill>
+                <a:latin typeface="Consolas" panose="020B0609020204030204" pitchFamily="49" charset="0"/>
+              </a:rPr>
+              <a:t> Girvan Newman</a:t>
+            </a:r>
+          </a:p>
+        </p:txBody>
+      </p:sp>
+      <p:pic>
+        <p:nvPicPr>
+          <p:cNvPr id="4" name="Picture 3">
+            <a:extLst>
+              <a:ext uri="{FF2B5EF4-FFF2-40B4-BE49-F238E27FC236}">
+                <a16:creationId xmlns:a16="http://schemas.microsoft.com/office/drawing/2014/main" id="{88DC09B2-3F0B-4C8C-B7C0-267E7D9AC73B}"/>
+              </a:ext>
+            </a:extLst>
+          </p:cNvPr>
+          <p:cNvPicPr>
+            <a:picLocks noChangeAspect="1"/>
+          </p:cNvPicPr>
+          <p:nvPr/>
+        </p:nvPicPr>
+        <p:blipFill>
+          <a:blip r:embed="rId3"/>
+          <a:stretch>
+            <a:fillRect/>
+          </a:stretch>
+        </p:blipFill>
+        <p:spPr>
+          <a:xfrm>
+            <a:off x="2805112" y="2735580"/>
+            <a:ext cx="6581775" cy="2438400"/>
+          </a:xfrm>
+          <a:prstGeom prst="rect">
+            <a:avLst/>
+          </a:prstGeom>
+        </p:spPr>
+      </p:pic>
+      <p:pic>
+        <p:nvPicPr>
+          <p:cNvPr id="7" name="Picture 6">
+            <a:extLst>
+              <a:ext uri="{FF2B5EF4-FFF2-40B4-BE49-F238E27FC236}">
+                <a16:creationId xmlns:a16="http://schemas.microsoft.com/office/drawing/2014/main" id="{A8B06AD3-BA8E-4DDA-B572-9BF2E23DB0AB}"/>
+              </a:ext>
+            </a:extLst>
+          </p:cNvPr>
+          <p:cNvPicPr>
+            <a:picLocks noChangeAspect="1"/>
+          </p:cNvPicPr>
+          <p:nvPr/>
+        </p:nvPicPr>
+        <p:blipFill>
+          <a:blip r:embed="rId4"/>
+          <a:stretch>
+            <a:fillRect/>
+          </a:stretch>
+        </p:blipFill>
+        <p:spPr>
+          <a:xfrm>
+            <a:off x="2946082" y="1398270"/>
+            <a:ext cx="5934075" cy="933450"/>
+          </a:xfrm>
+          <a:prstGeom prst="rect">
+            <a:avLst/>
+          </a:prstGeom>
+        </p:spPr>
+      </p:pic>
+    </p:spTree>
+    <p:extLst>
+      <p:ext uri="{BB962C8B-B14F-4D97-AF65-F5344CB8AC3E}">
+        <p14:creationId xmlns:p14="http://schemas.microsoft.com/office/powerpoint/2010/main" val="3096716653"/>
+      </p:ext>
+    </p:extLst>
+  </p:cSld>
+  <p:clrMapOvr>
+    <a:masterClrMapping/>
+  </p:clrMapOvr>
+</p:sld>
+</file>
+
+<file path=ppt/slides/slide14.xml><?xml version="1.0" encoding="utf-8"?>
+<p:sld xmlns:a="http://schemas.openxmlformats.org/drawingml/2006/main" xmlns:r="http://schemas.openxmlformats.org/officeDocument/2006/relationships" xmlns:p="http://schemas.openxmlformats.org/presentationml/2006/main">
+  <p:cSld>
+    <p:spTree>
+      <p:nvGrpSpPr>
+        <p:cNvPr id="1" name=""/>
+        <p:cNvGrpSpPr/>
+        <p:nvPr/>
+      </p:nvGrpSpPr>
+      <p:grpSpPr>
+        <a:xfrm>
+          <a:off x="0" y="0"/>
+          <a:ext cx="0" cy="0"/>
+          <a:chOff x="0" y="0"/>
+          <a:chExt cx="0" cy="0"/>
+        </a:xfrm>
+      </p:grpSpPr>
+      <p:sp>
+        <p:nvSpPr>
+          <p:cNvPr id="2" name="Title 1">
+            <a:extLst>
+              <a:ext uri="{FF2B5EF4-FFF2-40B4-BE49-F238E27FC236}">
+                <a16:creationId xmlns:a16="http://schemas.microsoft.com/office/drawing/2014/main" id="{BF3A7AC6-5FD4-46BF-8A93-9DDCC4F41B01}"/>
+              </a:ext>
+            </a:extLst>
+          </p:cNvPr>
+          <p:cNvSpPr>
+            <a:spLocks noGrp="1"/>
+          </p:cNvSpPr>
+          <p:nvPr>
+            <p:ph type="title"/>
+          </p:nvPr>
+        </p:nvSpPr>
+        <p:spPr>
+          <a:xfrm>
+            <a:off x="1106805" y="339643"/>
+            <a:ext cx="9978390" cy="654767"/>
+          </a:xfrm>
+        </p:spPr>
+        <p:txBody>
+          <a:bodyPr>
+            <a:normAutofit fontScale="90000"/>
+          </a:bodyPr>
+          <a:lstStyle/>
+          <a:p>
+            <a:pPr algn="ctr"/>
+            <a:r>
+              <a:rPr lang="en-US" sz="4000" dirty="0" err="1">
+                <a:solidFill>
+                  <a:srgbClr val="0070C0"/>
+                </a:solidFill>
+                <a:latin typeface="Consolas" panose="020B0609020204030204" pitchFamily="49" charset="0"/>
+              </a:rPr>
+              <a:t>Dùng</a:t>
+            </a:r>
+            <a:r>
+              <a:rPr lang="en-US" sz="4000" dirty="0">
+                <a:solidFill>
+                  <a:srgbClr val="0070C0"/>
+                </a:solidFill>
+                <a:latin typeface="Consolas" panose="020B0609020204030204" pitchFamily="49" charset="0"/>
+              </a:rPr>
+              <a:t> </a:t>
+            </a:r>
+            <a:r>
+              <a:rPr lang="en-US" sz="4000" dirty="0" err="1">
+                <a:solidFill>
+                  <a:srgbClr val="0070C0"/>
+                </a:solidFill>
+                <a:latin typeface="Consolas" panose="020B0609020204030204" pitchFamily="49" charset="0"/>
+              </a:rPr>
+              <a:t>thuật</a:t>
+            </a:r>
+            <a:r>
+              <a:rPr lang="en-US" sz="4000" dirty="0">
+                <a:solidFill>
+                  <a:srgbClr val="0070C0"/>
+                </a:solidFill>
+                <a:latin typeface="Consolas" panose="020B0609020204030204" pitchFamily="49" charset="0"/>
+              </a:rPr>
+              <a:t> </a:t>
+            </a:r>
+            <a:r>
+              <a:rPr lang="en-US" sz="4000" dirty="0" err="1">
+                <a:solidFill>
+                  <a:srgbClr val="0070C0"/>
+                </a:solidFill>
+                <a:latin typeface="Consolas" panose="020B0609020204030204" pitchFamily="49" charset="0"/>
+              </a:rPr>
+              <a:t>toán</a:t>
+            </a:r>
+            <a:r>
+              <a:rPr lang="en-US" sz="4000" dirty="0">
+                <a:solidFill>
+                  <a:srgbClr val="0070C0"/>
+                </a:solidFill>
+                <a:latin typeface="Consolas" panose="020B0609020204030204" pitchFamily="49" charset="0"/>
+              </a:rPr>
+              <a:t> </a:t>
+            </a:r>
+            <a:r>
+              <a:rPr lang="en-US" sz="4000" dirty="0" err="1">
+                <a:solidFill>
+                  <a:srgbClr val="0070C0"/>
+                </a:solidFill>
+                <a:latin typeface="Consolas" panose="020B0609020204030204" pitchFamily="49" charset="0"/>
+              </a:rPr>
+              <a:t>phân</a:t>
+            </a:r>
+            <a:r>
+              <a:rPr lang="en-US" sz="4000" dirty="0">
+                <a:solidFill>
+                  <a:srgbClr val="0070C0"/>
+                </a:solidFill>
+                <a:latin typeface="Consolas" panose="020B0609020204030204" pitchFamily="49" charset="0"/>
+              </a:rPr>
+              <a:t> </a:t>
+            </a:r>
+            <a:r>
+              <a:rPr lang="en-US" sz="4000" dirty="0" err="1">
+                <a:solidFill>
+                  <a:srgbClr val="0070C0"/>
+                </a:solidFill>
+                <a:latin typeface="Consolas" panose="020B0609020204030204" pitchFamily="49" charset="0"/>
+              </a:rPr>
+              <a:t>cụm</a:t>
+            </a:r>
+            <a:r>
+              <a:rPr lang="en-US" sz="4000" dirty="0">
+                <a:solidFill>
+                  <a:srgbClr val="0070C0"/>
+                </a:solidFill>
+                <a:latin typeface="Consolas" panose="020B0609020204030204" pitchFamily="49" charset="0"/>
+              </a:rPr>
+              <a:t> Girvan Newman</a:t>
+            </a:r>
+          </a:p>
+        </p:txBody>
+      </p:sp>
+      <p:pic>
+        <p:nvPicPr>
+          <p:cNvPr id="5" name="Picture 4">
+            <a:extLst>
+              <a:ext uri="{FF2B5EF4-FFF2-40B4-BE49-F238E27FC236}">
+                <a16:creationId xmlns:a16="http://schemas.microsoft.com/office/drawing/2014/main" id="{D11A5D9B-C312-44E8-9E28-19B00280683F}"/>
+              </a:ext>
+            </a:extLst>
+          </p:cNvPr>
+          <p:cNvPicPr>
+            <a:picLocks noChangeAspect="1"/>
+          </p:cNvPicPr>
+          <p:nvPr/>
+        </p:nvPicPr>
+        <p:blipFill>
+          <a:blip r:embed="rId3"/>
+          <a:stretch>
+            <a:fillRect/>
+          </a:stretch>
+        </p:blipFill>
+        <p:spPr>
+          <a:xfrm>
+            <a:off x="1497329" y="994410"/>
+            <a:ext cx="1746885" cy="5154930"/>
+          </a:xfrm>
+          <a:prstGeom prst="rect">
+            <a:avLst/>
+          </a:prstGeom>
+        </p:spPr>
+      </p:pic>
+      <p:pic>
+        <p:nvPicPr>
+          <p:cNvPr id="8" name="Picture 7">
+            <a:extLst>
+              <a:ext uri="{FF2B5EF4-FFF2-40B4-BE49-F238E27FC236}">
+                <a16:creationId xmlns:a16="http://schemas.microsoft.com/office/drawing/2014/main" id="{6D07B34C-96B4-45B2-9653-DC3BBA5F4CF9}"/>
+              </a:ext>
+            </a:extLst>
+          </p:cNvPr>
+          <p:cNvPicPr>
+            <a:picLocks noChangeAspect="1"/>
+          </p:cNvPicPr>
+          <p:nvPr/>
+        </p:nvPicPr>
+        <p:blipFill>
+          <a:blip r:embed="rId4"/>
+          <a:stretch>
+            <a:fillRect/>
+          </a:stretch>
+        </p:blipFill>
+        <p:spPr>
+          <a:xfrm>
+            <a:off x="4752022" y="2428875"/>
+            <a:ext cx="6162675" cy="2286000"/>
+          </a:xfrm>
+          <a:prstGeom prst="rect">
+            <a:avLst/>
+          </a:prstGeom>
+        </p:spPr>
+      </p:pic>
+    </p:spTree>
+    <p:extLst>
+      <p:ext uri="{BB962C8B-B14F-4D97-AF65-F5344CB8AC3E}">
+        <p14:creationId xmlns:p14="http://schemas.microsoft.com/office/powerpoint/2010/main" val="2608055980"/>
+      </p:ext>
+    </p:extLst>
+  </p:cSld>
+  <p:clrMapOvr>
+    <a:masterClrMapping/>
+  </p:clrMapOvr>
+</p:sld>
+</file>
+
+<file path=ppt/slides/slide15.xml><?xml version="1.0" encoding="utf-8"?>
+<p:sld xmlns:a="http://schemas.openxmlformats.org/drawingml/2006/main" xmlns:r="http://schemas.openxmlformats.org/officeDocument/2006/relationships" xmlns:p="http://schemas.openxmlformats.org/presentationml/2006/main">
+  <p:cSld>
+    <p:spTree>
+      <p:nvGrpSpPr>
+        <p:cNvPr id="1" name=""/>
+        <p:cNvGrpSpPr/>
+        <p:nvPr/>
+      </p:nvGrpSpPr>
+      <p:grpSpPr>
+        <a:xfrm>
+          <a:off x="0" y="0"/>
+          <a:ext cx="0" cy="0"/>
+          <a:chOff x="0" y="0"/>
+          <a:chExt cx="0" cy="0"/>
+        </a:xfrm>
+      </p:grpSpPr>
+      <p:sp>
+        <p:nvSpPr>
+          <p:cNvPr id="2" name="Title 1">
+            <a:extLst>
+              <a:ext uri="{FF2B5EF4-FFF2-40B4-BE49-F238E27FC236}">
+                <a16:creationId xmlns:a16="http://schemas.microsoft.com/office/drawing/2014/main" id="{BF3A7AC6-5FD4-46BF-8A93-9DDCC4F41B01}"/>
+              </a:ext>
+            </a:extLst>
+          </p:cNvPr>
+          <p:cNvSpPr>
+            <a:spLocks noGrp="1"/>
+          </p:cNvSpPr>
+          <p:nvPr>
+            <p:ph type="title"/>
+          </p:nvPr>
+        </p:nvSpPr>
+        <p:spPr>
+          <a:xfrm>
+            <a:off x="1106805" y="339643"/>
+            <a:ext cx="9978390" cy="654767"/>
+          </a:xfrm>
+        </p:spPr>
+        <p:txBody>
+          <a:bodyPr>
+            <a:normAutofit/>
+          </a:bodyPr>
+          <a:lstStyle/>
+          <a:p>
+            <a:pPr algn="ctr"/>
+            <a:r>
+              <a:rPr lang="en-US" sz="4000" dirty="0">
+                <a:solidFill>
+                  <a:srgbClr val="0070C0"/>
+                </a:solidFill>
+                <a:latin typeface="Consolas" panose="020B0609020204030204" pitchFamily="49" charset="0"/>
+              </a:rPr>
+              <a:t>VISUALIZE GIVAN NEWMAN</a:t>
+            </a:r>
+          </a:p>
+        </p:txBody>
+      </p:sp>
+      <p:pic>
+        <p:nvPicPr>
+          <p:cNvPr id="4" name="Picture 3">
+            <a:extLst>
+              <a:ext uri="{FF2B5EF4-FFF2-40B4-BE49-F238E27FC236}">
+                <a16:creationId xmlns:a16="http://schemas.microsoft.com/office/drawing/2014/main" id="{86D1FD1F-0DD7-43F8-98CC-D5D70D556C0C}"/>
+              </a:ext>
+            </a:extLst>
+          </p:cNvPr>
+          <p:cNvPicPr>
+            <a:picLocks noChangeAspect="1"/>
+          </p:cNvPicPr>
+          <p:nvPr/>
+        </p:nvPicPr>
+        <p:blipFill>
+          <a:blip r:embed="rId3"/>
+          <a:stretch>
+            <a:fillRect/>
+          </a:stretch>
+        </p:blipFill>
+        <p:spPr>
+          <a:xfrm>
+            <a:off x="863909" y="1124282"/>
+            <a:ext cx="10464181" cy="5394075"/>
+          </a:xfrm>
+          <a:prstGeom prst="rect">
+            <a:avLst/>
+          </a:prstGeom>
+        </p:spPr>
+      </p:pic>
+    </p:spTree>
+    <p:extLst>
+      <p:ext uri="{BB962C8B-B14F-4D97-AF65-F5344CB8AC3E}">
+        <p14:creationId xmlns:p14="http://schemas.microsoft.com/office/powerpoint/2010/main" val="1941565529"/>
+      </p:ext>
+    </p:extLst>
+  </p:cSld>
+  <p:clrMapOvr>
+    <a:masterClrMapping/>
+  </p:clrMapOvr>
+</p:sld>
+</file>
+
+<file path=ppt/slides/slide16.xml><?xml version="1.0" encoding="utf-8"?>
+<p:sld xmlns:a="http://schemas.openxmlformats.org/drawingml/2006/main" xmlns:r="http://schemas.openxmlformats.org/officeDocument/2006/relationships" xmlns:p="http://schemas.openxmlformats.org/presentationml/2006/main">
+  <p:cSld>
+    <p:spTree>
+      <p:nvGrpSpPr>
+        <p:cNvPr id="1" name=""/>
+        <p:cNvGrpSpPr/>
+        <p:nvPr/>
+      </p:nvGrpSpPr>
+      <p:grpSpPr>
+        <a:xfrm>
+          <a:off x="0" y="0"/>
+          <a:ext cx="0" cy="0"/>
+          <a:chOff x="0" y="0"/>
+          <a:chExt cx="0" cy="0"/>
+        </a:xfrm>
+      </p:grpSpPr>
+      <p:sp>
+        <p:nvSpPr>
           <p:cNvPr id="4" name="TextBox 3">
             <a:extLst>
               <a:ext uri="{FF2B5EF4-FFF2-40B4-BE49-F238E27FC236}">
@@ -5516,7 +6309,7 @@
 </p:sld>
 </file>
 
-<file path=ppt/slides/slide14.xml><?xml version="1.0" encoding="utf-8"?>
+<file path=ppt/slides/slide17.xml><?xml version="1.0" encoding="utf-8"?>
 <p:sld xmlns:a="http://schemas.openxmlformats.org/drawingml/2006/main" xmlns:r="http://schemas.openxmlformats.org/officeDocument/2006/relationships" xmlns:p="http://schemas.openxmlformats.org/presentationml/2006/main">
   <p:cSld>
     <p:spTree>
@@ -5646,7 +6439,7 @@
 </p:sld>
 </file>
 
-<file path=ppt/slides/slide15.xml><?xml version="1.0" encoding="utf-8"?>
+<file path=ppt/slides/slide18.xml><?xml version="1.0" encoding="utf-8"?>
 <p:sld xmlns:a="http://schemas.openxmlformats.org/drawingml/2006/main" xmlns:r="http://schemas.openxmlformats.org/officeDocument/2006/relationships" xmlns:p="http://schemas.openxmlformats.org/presentationml/2006/main">
   <p:cSld>
     <p:spTree>
@@ -5752,7 +6545,7 @@
 </p:sld>
 </file>
 
-<file path=ppt/slides/slide16.xml><?xml version="1.0" encoding="utf-8"?>
+<file path=ppt/slides/slide19.xml><?xml version="1.0" encoding="utf-8"?>
 <p:sld xmlns:a="http://schemas.openxmlformats.org/drawingml/2006/main" xmlns:r="http://schemas.openxmlformats.org/officeDocument/2006/relationships" xmlns:p="http://schemas.openxmlformats.org/presentationml/2006/main">
   <p:cSld>
     <p:spTree>
@@ -6209,7 +7002,373 @@
 </p:sld>
 </file>
 
-<file path=ppt/slides/slide17.xml><?xml version="1.0" encoding="utf-8"?>
+<file path=ppt/slides/slide2.xml><?xml version="1.0" encoding="utf-8"?>
+<p:sld xmlns:a="http://schemas.openxmlformats.org/drawingml/2006/main" xmlns:r="http://schemas.openxmlformats.org/officeDocument/2006/relationships" xmlns:p="http://schemas.openxmlformats.org/presentationml/2006/main">
+  <p:cSld>
+    <p:spTree>
+      <p:nvGrpSpPr>
+        <p:cNvPr id="1" name=""/>
+        <p:cNvGrpSpPr/>
+        <p:nvPr/>
+      </p:nvGrpSpPr>
+      <p:grpSpPr>
+        <a:xfrm>
+          <a:off x="0" y="0"/>
+          <a:ext cx="0" cy="0"/>
+          <a:chOff x="0" y="0"/>
+          <a:chExt cx="0" cy="0"/>
+        </a:xfrm>
+      </p:grpSpPr>
+      <p:sp>
+        <p:nvSpPr>
+          <p:cNvPr id="2" name="Title 1">
+            <a:extLst>
+              <a:ext uri="{FF2B5EF4-FFF2-40B4-BE49-F238E27FC236}">
+                <a16:creationId xmlns:a16="http://schemas.microsoft.com/office/drawing/2014/main" id="{BFEC5E77-0B6B-4F26-A663-16B65B47DA07}"/>
+              </a:ext>
+            </a:extLst>
+          </p:cNvPr>
+          <p:cNvSpPr>
+            <a:spLocks noGrp="1"/>
+          </p:cNvSpPr>
+          <p:nvPr>
+            <p:ph type="ctrTitle"/>
+          </p:nvPr>
+        </p:nvSpPr>
+        <p:spPr>
+          <a:xfrm>
+            <a:off x="1282942" y="342398"/>
+            <a:ext cx="9626115" cy="1508760"/>
+          </a:xfrm>
+        </p:spPr>
+        <p:txBody>
+          <a:bodyPr>
+            <a:normAutofit/>
+          </a:bodyPr>
+          <a:lstStyle/>
+          <a:p>
+            <a:r>
+              <a:rPr lang="en-US" sz="4800" dirty="0" err="1">
+                <a:solidFill>
+                  <a:srgbClr val="0070C0"/>
+                </a:solidFill>
+                <a:latin typeface="Consolas" panose="020B0609020204030204" pitchFamily="49" charset="0"/>
+              </a:rPr>
+              <a:t>Phân</a:t>
+            </a:r>
+            <a:r>
+              <a:rPr lang="en-US" sz="4800" dirty="0">
+                <a:solidFill>
+                  <a:srgbClr val="0070C0"/>
+                </a:solidFill>
+                <a:latin typeface="Consolas" panose="020B0609020204030204" pitchFamily="49" charset="0"/>
+              </a:rPr>
+              <a:t> </a:t>
+            </a:r>
+            <a:r>
+              <a:rPr lang="en-US" sz="4800" dirty="0" err="1">
+                <a:solidFill>
+                  <a:srgbClr val="0070C0"/>
+                </a:solidFill>
+                <a:latin typeface="Consolas" panose="020B0609020204030204" pitchFamily="49" charset="0"/>
+              </a:rPr>
+              <a:t>tích</a:t>
+            </a:r>
+            <a:r>
+              <a:rPr lang="en-US" sz="4800" dirty="0">
+                <a:solidFill>
+                  <a:srgbClr val="0070C0"/>
+                </a:solidFill>
+                <a:latin typeface="Consolas" panose="020B0609020204030204" pitchFamily="49" charset="0"/>
+              </a:rPr>
+              <a:t> </a:t>
+            </a:r>
+            <a:r>
+              <a:rPr lang="en-US" sz="4800" dirty="0" err="1">
+                <a:solidFill>
+                  <a:srgbClr val="0070C0"/>
+                </a:solidFill>
+                <a:latin typeface="Consolas" panose="020B0609020204030204" pitchFamily="49" charset="0"/>
+              </a:rPr>
+              <a:t>khám</a:t>
+            </a:r>
+            <a:r>
+              <a:rPr lang="en-US" sz="4800" dirty="0">
+                <a:solidFill>
+                  <a:srgbClr val="0070C0"/>
+                </a:solidFill>
+                <a:latin typeface="Consolas" panose="020B0609020204030204" pitchFamily="49" charset="0"/>
+              </a:rPr>
+              <a:t> </a:t>
+            </a:r>
+            <a:r>
+              <a:rPr lang="en-US" sz="4800" dirty="0" err="1">
+                <a:solidFill>
+                  <a:srgbClr val="0070C0"/>
+                </a:solidFill>
+                <a:latin typeface="Consolas" panose="020B0609020204030204" pitchFamily="49" charset="0"/>
+              </a:rPr>
+              <a:t>phá</a:t>
+            </a:r>
+            <a:r>
+              <a:rPr lang="en-US" sz="4800" dirty="0">
+                <a:solidFill>
+                  <a:srgbClr val="0070C0"/>
+                </a:solidFill>
+                <a:latin typeface="Consolas" panose="020B0609020204030204" pitchFamily="49" charset="0"/>
+              </a:rPr>
+              <a:t> </a:t>
+            </a:r>
+            <a:r>
+              <a:rPr lang="en-US" sz="4800" dirty="0" err="1">
+                <a:solidFill>
+                  <a:srgbClr val="0070C0"/>
+                </a:solidFill>
+                <a:latin typeface="Consolas" panose="020B0609020204030204" pitchFamily="49" charset="0"/>
+              </a:rPr>
+              <a:t>Bộ</a:t>
+            </a:r>
+            <a:r>
+              <a:rPr lang="en-US" sz="4800" dirty="0">
+                <a:solidFill>
+                  <a:srgbClr val="0070C0"/>
+                </a:solidFill>
+                <a:latin typeface="Consolas" panose="020B0609020204030204" pitchFamily="49" charset="0"/>
+              </a:rPr>
+              <a:t> </a:t>
+            </a:r>
+            <a:r>
+              <a:rPr lang="en-US" sz="4800" dirty="0" err="1">
+                <a:solidFill>
+                  <a:srgbClr val="0070C0"/>
+                </a:solidFill>
+                <a:latin typeface="Consolas" panose="020B0609020204030204" pitchFamily="49" charset="0"/>
+              </a:rPr>
+              <a:t>dữ</a:t>
+            </a:r>
+            <a:r>
+              <a:rPr lang="en-US" sz="4800" dirty="0">
+                <a:solidFill>
+                  <a:srgbClr val="0070C0"/>
+                </a:solidFill>
+                <a:latin typeface="Consolas" panose="020B0609020204030204" pitchFamily="49" charset="0"/>
+              </a:rPr>
+              <a:t> </a:t>
+            </a:r>
+            <a:r>
+              <a:rPr lang="en-US" sz="4800" dirty="0" err="1">
+                <a:solidFill>
+                  <a:srgbClr val="0070C0"/>
+                </a:solidFill>
+                <a:latin typeface="Consolas" panose="020B0609020204030204" pitchFamily="49" charset="0"/>
+              </a:rPr>
+              <a:t>liệu</a:t>
+            </a:r>
+            <a:r>
+              <a:rPr lang="en-US" sz="4800" dirty="0">
+                <a:solidFill>
+                  <a:srgbClr val="0070C0"/>
+                </a:solidFill>
+                <a:latin typeface="Consolas" panose="020B0609020204030204" pitchFamily="49" charset="0"/>
+              </a:rPr>
+              <a:t> </a:t>
+            </a:r>
+            <a:r>
+              <a:rPr lang="en-US" sz="4800" dirty="0" err="1">
+                <a:solidFill>
+                  <a:srgbClr val="0070C0"/>
+                </a:solidFill>
+                <a:latin typeface="Consolas" panose="020B0609020204030204" pitchFamily="49" charset="0"/>
+              </a:rPr>
+              <a:t>phiếu</a:t>
+            </a:r>
+            <a:r>
+              <a:rPr lang="en-US" sz="4800" dirty="0">
+                <a:solidFill>
+                  <a:srgbClr val="0070C0"/>
+                </a:solidFill>
+                <a:latin typeface="Consolas" panose="020B0609020204030204" pitchFamily="49" charset="0"/>
+              </a:rPr>
+              <a:t> </a:t>
+            </a:r>
+            <a:r>
+              <a:rPr lang="en-US" sz="4800" dirty="0" err="1">
+                <a:solidFill>
+                  <a:srgbClr val="0070C0"/>
+                </a:solidFill>
+                <a:latin typeface="Consolas" panose="020B0609020204030204" pitchFamily="49" charset="0"/>
+              </a:rPr>
+              <a:t>bầu</a:t>
+            </a:r>
+            <a:r>
+              <a:rPr lang="en-US" sz="4800" dirty="0">
+                <a:solidFill>
+                  <a:srgbClr val="0070C0"/>
+                </a:solidFill>
+                <a:latin typeface="Consolas" panose="020B0609020204030204" pitchFamily="49" charset="0"/>
+              </a:rPr>
+              <a:t> Eurovision</a:t>
+            </a:r>
+          </a:p>
+        </p:txBody>
+      </p:sp>
+      <p:sp>
+        <p:nvSpPr>
+          <p:cNvPr id="3" name="Subtitle 2">
+            <a:extLst>
+              <a:ext uri="{FF2B5EF4-FFF2-40B4-BE49-F238E27FC236}">
+                <a16:creationId xmlns:a16="http://schemas.microsoft.com/office/drawing/2014/main" id="{89EFE583-3F59-40CA-B57B-47832FC5E367}"/>
+              </a:ext>
+            </a:extLst>
+          </p:cNvPr>
+          <p:cNvSpPr>
+            <a:spLocks noGrp="1"/>
+          </p:cNvSpPr>
+          <p:nvPr>
+            <p:ph type="subTitle" idx="1"/>
+          </p:nvPr>
+        </p:nvSpPr>
+        <p:spPr>
+          <a:xfrm>
+            <a:off x="877061" y="4718958"/>
+            <a:ext cx="10437878" cy="1042264"/>
+          </a:xfrm>
+        </p:spPr>
+        <p:txBody>
+          <a:bodyPr>
+            <a:normAutofit fontScale="77500" lnSpcReduction="20000"/>
+          </a:bodyPr>
+          <a:lstStyle/>
+          <a:p>
+            <a:r>
+              <a:rPr lang="en-US" dirty="0">
+                <a:solidFill>
+                  <a:schemeClr val="tx1"/>
+                </a:solidFill>
+                <a:latin typeface="Consolas" panose="020B0609020204030204" pitchFamily="49" charset="0"/>
+              </a:rPr>
+              <a:t>LINK DATA :</a:t>
+            </a:r>
+          </a:p>
+          <a:p>
+            <a:r>
+              <a:rPr lang="en-US" dirty="0">
+                <a:solidFill>
+                  <a:schemeClr val="tx1"/>
+                </a:solidFill>
+                <a:latin typeface="Consolas" panose="020B0609020204030204" pitchFamily="49" charset="0"/>
+                <a:hlinkClick r:id="rId2">
+                  <a:extLst>
+                    <a:ext uri="{A12FA001-AC4F-418D-AE19-62706E023703}">
+                      <ahyp:hlinkClr xmlns:ahyp="http://schemas.microsoft.com/office/drawing/2018/hyperlinkcolor" val="tx"/>
+                    </a:ext>
+                  </a:extLst>
+                </a:hlinkClick>
+              </a:rPr>
+              <a:t>https://eurovision.tv/story/the-results-eurovision-2018-dive-into-numbers</a:t>
+            </a:r>
+            <a:endParaRPr lang="en-US" dirty="0">
+              <a:solidFill>
+                <a:schemeClr val="tx1"/>
+              </a:solidFill>
+              <a:latin typeface="Consolas" panose="020B0609020204030204" pitchFamily="49" charset="0"/>
+            </a:endParaRPr>
+          </a:p>
+          <a:p>
+            <a:r>
+              <a:rPr lang="en-US" dirty="0">
+                <a:solidFill>
+                  <a:schemeClr val="tx1"/>
+                </a:solidFill>
+                <a:latin typeface="Consolas" panose="020B0609020204030204" pitchFamily="49" charset="0"/>
+                <a:hlinkClick r:id="rId3">
+                  <a:extLst>
+                    <a:ext uri="{A12FA001-AC4F-418D-AE19-62706E023703}">
+                      <ahyp:hlinkClr xmlns:ahyp="http://schemas.microsoft.com/office/drawing/2018/hyperlinkcolor" val="tx"/>
+                    </a:ext>
+                  </a:extLst>
+                </a:hlinkClick>
+              </a:rPr>
+              <a:t>https://github.com/dimgold/pycon_social_networkx/blob/master/ESC2018_GF.xlsx</a:t>
+            </a:r>
+            <a:endParaRPr lang="en-US" dirty="0">
+              <a:solidFill>
+                <a:schemeClr val="tx1"/>
+              </a:solidFill>
+              <a:latin typeface="Consolas" panose="020B0609020204030204" pitchFamily="49" charset="0"/>
+            </a:endParaRPr>
+          </a:p>
+          <a:p>
+            <a:endParaRPr lang="en-US" dirty="0">
+              <a:solidFill>
+                <a:schemeClr val="tx1"/>
+              </a:solidFill>
+              <a:latin typeface="Consolas" panose="020B0609020204030204" pitchFamily="49" charset="0"/>
+            </a:endParaRPr>
+          </a:p>
+        </p:txBody>
+      </p:sp>
+      <p:pic>
+        <p:nvPicPr>
+          <p:cNvPr id="1026" name="Picture 2">
+            <a:extLst>
+              <a:ext uri="{FF2B5EF4-FFF2-40B4-BE49-F238E27FC236}">
+                <a16:creationId xmlns:a16="http://schemas.microsoft.com/office/drawing/2014/main" id="{2DAAB5B4-7964-4DD2-A73A-D0E52B0DCB94}"/>
+              </a:ext>
+            </a:extLst>
+          </p:cNvPr>
+          <p:cNvPicPr>
+            <a:picLocks noChangeAspect="1" noChangeArrowheads="1"/>
+          </p:cNvPicPr>
+          <p:nvPr/>
+        </p:nvPicPr>
+        <p:blipFill>
+          <a:blip r:embed="rId4">
+            <a:extLst>
+              <a:ext uri="{28A0092B-C50C-407E-A947-70E740481C1C}">
+                <a14:useLocalDpi xmlns:a14="http://schemas.microsoft.com/office/drawing/2010/main" val="0"/>
+              </a:ext>
+            </a:extLst>
+          </a:blip>
+          <a:srcRect/>
+          <a:stretch>
+            <a:fillRect/>
+          </a:stretch>
+        </p:blipFill>
+        <p:spPr bwMode="auto">
+          <a:xfrm>
+            <a:off x="3409950" y="2245179"/>
+            <a:ext cx="5372100" cy="1714500"/>
+          </a:xfrm>
+          <a:prstGeom prst="rect">
+            <a:avLst/>
+          </a:prstGeom>
+          <a:noFill/>
+          <a:extLst>
+            <a:ext uri="{909E8E84-426E-40DD-AFC4-6F175D3DCCD1}">
+              <a14:hiddenFill xmlns:a14="http://schemas.microsoft.com/office/drawing/2010/main">
+                <a:solidFill>
+                  <a:srgbClr val="FFFFFF"/>
+                </a:solidFill>
+              </a14:hiddenFill>
+            </a:ext>
+          </a:extLst>
+        </p:spPr>
+      </p:pic>
+    </p:spTree>
+    <p:extLst>
+      <p:ext uri="{BB962C8B-B14F-4D97-AF65-F5344CB8AC3E}">
+        <p14:creationId xmlns:p14="http://schemas.microsoft.com/office/powerpoint/2010/main" val="2760119894"/>
+      </p:ext>
+    </p:extLst>
+  </p:cSld>
+  <p:clrMapOvr>
+    <a:masterClrMapping/>
+  </p:clrMapOvr>
+</p:sld>
+</file>
+
+<file path=ppt/slides/slide20.xml><?xml version="1.0" encoding="utf-8"?>
 <p:sld xmlns:a="http://schemas.openxmlformats.org/drawingml/2006/main" xmlns:r="http://schemas.openxmlformats.org/officeDocument/2006/relationships" xmlns:p="http://schemas.openxmlformats.org/presentationml/2006/main">
   <p:cSld>
     <p:spTree>
@@ -6309,7 +7468,7 @@
 </p:sld>
 </file>
 
-<file path=ppt/slides/slide18.xml><?xml version="1.0" encoding="utf-8"?>
+<file path=ppt/slides/slide21.xml><?xml version="1.0" encoding="utf-8"?>
 <p:sld xmlns:a="http://schemas.openxmlformats.org/drawingml/2006/main" xmlns:r="http://schemas.openxmlformats.org/officeDocument/2006/relationships" xmlns:p="http://schemas.openxmlformats.org/presentationml/2006/main">
   <p:cSld>
     <p:spTree>
@@ -6415,7 +7574,7 @@
 </p:sld>
 </file>
 
-<file path=ppt/slides/slide19.xml><?xml version="1.0" encoding="utf-8"?>
+<file path=ppt/slides/slide22.xml><?xml version="1.0" encoding="utf-8"?>
 <p:sld xmlns:a="http://schemas.openxmlformats.org/drawingml/2006/main" xmlns:r="http://schemas.openxmlformats.org/officeDocument/2006/relationships" xmlns:p="http://schemas.openxmlformats.org/presentationml/2006/main">
   <p:cSld>
     <p:spTree>
@@ -6738,7 +7897,7 @@
 </p:sld>
 </file>
 
-<file path=ppt/slides/slide2.xml><?xml version="1.0" encoding="utf-8"?>
+<file path=ppt/slides/slide23.xml><?xml version="1.0" encoding="utf-8"?>
 <p:sld xmlns:a="http://schemas.openxmlformats.org/drawingml/2006/main" xmlns:r="http://schemas.openxmlformats.org/officeDocument/2006/relationships" xmlns:p="http://schemas.openxmlformats.org/presentationml/2006/main">
   <p:cSld>
     <p:spTree>
@@ -6757,10 +7916,10 @@
       </p:grpSpPr>
       <p:sp>
         <p:nvSpPr>
-          <p:cNvPr id="2" name="Title 1">
-            <a:extLst>
-              <a:ext uri="{FF2B5EF4-FFF2-40B4-BE49-F238E27FC236}">
-                <a16:creationId xmlns:a16="http://schemas.microsoft.com/office/drawing/2014/main" id="{BFEC5E77-0B6B-4F26-A663-16B65B47DA07}"/>
+          <p:cNvPr id="5" name="Title 4">
+            <a:extLst>
+              <a:ext uri="{FF2B5EF4-FFF2-40B4-BE49-F238E27FC236}">
+                <a16:creationId xmlns:a16="http://schemas.microsoft.com/office/drawing/2014/main" id="{067F0057-052A-46A6-849C-C0F6D83D85AB}"/>
               </a:ext>
             </a:extLst>
           </p:cNvPr>
@@ -6773,202 +7932,32 @@
         </p:nvSpPr>
         <p:spPr>
           <a:xfrm>
-            <a:off x="1090092" y="342900"/>
-            <a:ext cx="9626115" cy="1143000"/>
+            <a:off x="614521" y="2286000"/>
+            <a:ext cx="10962958" cy="1303020"/>
           </a:xfrm>
         </p:spPr>
         <p:txBody>
           <a:bodyPr>
-            <a:normAutofit fontScale="90000"/>
+            <a:noAutofit/>
           </a:bodyPr>
           <a:lstStyle/>
           <a:p>
             <a:r>
-              <a:rPr lang="en-US" dirty="0" err="1">
+              <a:rPr lang="en-US" sz="4000" dirty="0">
                 <a:solidFill>
                   <a:srgbClr val="0070C0"/>
                 </a:solidFill>
                 <a:latin typeface="Consolas" panose="020B0609020204030204" pitchFamily="49" charset="0"/>
               </a:rPr>
-              <a:t>Cuộc</a:t>
-            </a:r>
-            <a:r>
-              <a:rPr lang="en-US" dirty="0">
-                <a:solidFill>
-                  <a:srgbClr val="0070C0"/>
-                </a:solidFill>
-                <a:latin typeface="Consolas" panose="020B0609020204030204" pitchFamily="49" charset="0"/>
-              </a:rPr>
-              <a:t> </a:t>
-            </a:r>
-            <a:r>
-              <a:rPr lang="en-US" dirty="0" err="1">
-                <a:solidFill>
-                  <a:srgbClr val="0070C0"/>
-                </a:solidFill>
-                <a:latin typeface="Consolas" panose="020B0609020204030204" pitchFamily="49" charset="0"/>
-              </a:rPr>
-              <a:t>thi</a:t>
-            </a:r>
-            <a:r>
-              <a:rPr lang="en-US" dirty="0">
-                <a:solidFill>
-                  <a:srgbClr val="0070C0"/>
-                </a:solidFill>
-                <a:latin typeface="Consolas" panose="020B0609020204030204" pitchFamily="49" charset="0"/>
-              </a:rPr>
-              <a:t> Eurovision song </a:t>
-            </a:r>
-          </a:p>
-        </p:txBody>
-      </p:sp>
-      <p:sp>
-        <p:nvSpPr>
-          <p:cNvPr id="3" name="Subtitle 2">
-            <a:extLst>
-              <a:ext uri="{FF2B5EF4-FFF2-40B4-BE49-F238E27FC236}">
-                <a16:creationId xmlns:a16="http://schemas.microsoft.com/office/drawing/2014/main" id="{89EFE583-3F59-40CA-B57B-47832FC5E367}"/>
-              </a:ext>
-            </a:extLst>
-          </p:cNvPr>
-          <p:cNvSpPr>
-            <a:spLocks noGrp="1"/>
-          </p:cNvSpPr>
-          <p:nvPr>
-            <p:ph type="subTitle" idx="1"/>
-          </p:nvPr>
-        </p:nvSpPr>
-        <p:spPr>
-          <a:xfrm>
-            <a:off x="877061" y="4718958"/>
-            <a:ext cx="10437878" cy="1042264"/>
-          </a:xfrm>
-        </p:spPr>
-        <p:txBody>
-          <a:bodyPr>
-            <a:normAutofit fontScale="77500" lnSpcReduction="20000"/>
-          </a:bodyPr>
-          <a:lstStyle/>
-          <a:p>
-            <a:r>
-              <a:rPr lang="en-US" dirty="0">
-                <a:solidFill>
-                  <a:schemeClr val="tx1"/>
-                </a:solidFill>
-                <a:latin typeface="Consolas" panose="020B0609020204030204" pitchFamily="49" charset="0"/>
-              </a:rPr>
-              <a:t>LINK DATA :</a:t>
-            </a:r>
-          </a:p>
-          <a:p>
-            <a:r>
-              <a:rPr lang="en-US" dirty="0">
-                <a:solidFill>
-                  <a:schemeClr val="tx1"/>
-                </a:solidFill>
-                <a:latin typeface="Consolas" panose="020B0609020204030204" pitchFamily="49" charset="0"/>
-                <a:hlinkClick r:id="rId2">
-                  <a:extLst>
-                    <a:ext uri="{A12FA001-AC4F-418D-AE19-62706E023703}">
-                      <ahyp:hlinkClr xmlns:ahyp="http://schemas.microsoft.com/office/drawing/2018/hyperlinkcolor" val="tx"/>
-                    </a:ext>
-                  </a:extLst>
-                </a:hlinkClick>
-              </a:rPr>
-              <a:t>https://eurovision.tv/story/the-results-eurovision-2018-dive-into-numbers</a:t>
-            </a:r>
-            <a:endParaRPr lang="en-US" dirty="0">
-              <a:solidFill>
-                <a:schemeClr val="tx1"/>
-              </a:solidFill>
-              <a:latin typeface="Consolas" panose="020B0609020204030204" pitchFamily="49" charset="0"/>
-            </a:endParaRPr>
-          </a:p>
-          <a:p>
-            <a:r>
-              <a:rPr lang="en-US" dirty="0">
-                <a:solidFill>
-                  <a:schemeClr val="tx1"/>
-                </a:solidFill>
-                <a:latin typeface="Consolas" panose="020B0609020204030204" pitchFamily="49" charset="0"/>
-                <a:hlinkClick r:id="rId3">
-                  <a:extLst>
-                    <a:ext uri="{A12FA001-AC4F-418D-AE19-62706E023703}">
-                      <ahyp:hlinkClr xmlns:ahyp="http://schemas.microsoft.com/office/drawing/2018/hyperlinkcolor" val="tx"/>
-                    </a:ext>
-                  </a:extLst>
-                </a:hlinkClick>
-              </a:rPr>
-              <a:t>https://github.com/dimgold/pycon_social_networkx/blob/master/ESC2018_GF.xlsx</a:t>
-            </a:r>
-            <a:endParaRPr lang="en-US" dirty="0">
-              <a:solidFill>
-                <a:schemeClr val="tx1"/>
-              </a:solidFill>
-              <a:latin typeface="Consolas" panose="020B0609020204030204" pitchFamily="49" charset="0"/>
-            </a:endParaRPr>
-          </a:p>
-          <a:p>
-            <a:endParaRPr lang="en-US" dirty="0">
-              <a:solidFill>
-                <a:schemeClr val="tx1"/>
-              </a:solidFill>
-              <a:latin typeface="Consolas" panose="020B0609020204030204" pitchFamily="49" charset="0"/>
-            </a:endParaRPr>
-          </a:p>
-        </p:txBody>
-      </p:sp>
-      <p:pic>
-        <p:nvPicPr>
-          <p:cNvPr id="1026" name="Picture 2">
-            <a:extLst>
-              <a:ext uri="{FF2B5EF4-FFF2-40B4-BE49-F238E27FC236}">
-                <a16:creationId xmlns:a16="http://schemas.microsoft.com/office/drawing/2014/main" id="{2DAAB5B4-7964-4DD2-A73A-D0E52B0DCB94}"/>
-              </a:ext>
-            </a:extLst>
-          </p:cNvPr>
-          <p:cNvPicPr>
-            <a:picLocks noChangeAspect="1" noChangeArrowheads="1"/>
-          </p:cNvPicPr>
-          <p:nvPr/>
-        </p:nvPicPr>
-        <p:blipFill>
-          <a:blip r:embed="rId4">
-            <a:extLst>
-              <a:ext uri="{28A0092B-C50C-407E-A947-70E740481C1C}">
-                <a14:useLocalDpi xmlns:a14="http://schemas.microsoft.com/office/drawing/2010/main" val="0"/>
-              </a:ext>
-            </a:extLst>
-          </a:blip>
-          <a:srcRect/>
-          <a:stretch>
-            <a:fillRect/>
-          </a:stretch>
-        </p:blipFill>
-        <p:spPr bwMode="auto">
-          <a:xfrm>
-            <a:off x="3409950" y="2245179"/>
-            <a:ext cx="5372100" cy="1714500"/>
-          </a:xfrm>
-          <a:prstGeom prst="rect">
-            <a:avLst/>
-          </a:prstGeom>
-          <a:noFill/>
-          <a:extLst>
-            <a:ext uri="{909E8E84-426E-40DD-AFC4-6F175D3DCCD1}">
-              <a14:hiddenFill xmlns:a14="http://schemas.microsoft.com/office/drawing/2010/main">
-                <a:solidFill>
-                  <a:srgbClr val="FFFFFF"/>
-                </a:solidFill>
-              </a14:hiddenFill>
-            </a:ext>
-          </a:extLst>
-        </p:spPr>
-      </p:pic>
+              <a:t>CẢM ƠN CÔ VÀ CÁC BẠN ĐÃ LẮNG NGHE !</a:t>
+            </a:r>
+          </a:p>
+        </p:txBody>
+      </p:sp>
     </p:spTree>
     <p:extLst>
       <p:ext uri="{BB962C8B-B14F-4D97-AF65-F5344CB8AC3E}">
-        <p14:creationId xmlns:p14="http://schemas.microsoft.com/office/powerpoint/2010/main" val="2760119894"/>
+        <p14:creationId xmlns:p14="http://schemas.microsoft.com/office/powerpoint/2010/main" val="2043596123"/>
       </p:ext>
     </p:extLst>
   </p:cSld>

</xml_diff>